<commit_message>
working on lec 5 rmd
</commit_message>
<xml_diff>
--- a/docs/Lectures/Week 3/lec_05_uni_state_space.pptx
+++ b/docs/Lectures/Week 3/lec_05_uni_state_space.pptx
@@ -5,10 +5,10 @@
     <p:sldMasterId id="2147483648" r:id="rId1"/>
   </p:sldMasterIdLst>
   <p:notesMasterIdLst>
-    <p:notesMasterId r:id="rId46"/>
+    <p:notesMasterId r:id="rId48"/>
   </p:notesMasterIdLst>
   <p:handoutMasterIdLst>
-    <p:handoutMasterId r:id="rId47"/>
+    <p:handoutMasterId r:id="rId49"/>
   </p:handoutMasterIdLst>
   <p:sldIdLst>
     <p:sldId id="576" r:id="rId2"/>
@@ -42,10 +42,10 @@
     <p:sldId id="616" r:id="rId30"/>
     <p:sldId id="626" r:id="rId31"/>
     <p:sldId id="615" r:id="rId32"/>
-    <p:sldId id="617" r:id="rId33"/>
-    <p:sldId id="605" r:id="rId34"/>
-    <p:sldId id="606" r:id="rId35"/>
-    <p:sldId id="629" r:id="rId36"/>
+    <p:sldId id="634" r:id="rId33"/>
+    <p:sldId id="617" r:id="rId34"/>
+    <p:sldId id="636" r:id="rId35"/>
+    <p:sldId id="631" r:id="rId36"/>
     <p:sldId id="622" r:id="rId37"/>
     <p:sldId id="618" r:id="rId38"/>
     <p:sldId id="619" r:id="rId39"/>
@@ -53,8 +53,10 @@
     <p:sldId id="621" r:id="rId41"/>
     <p:sldId id="623" r:id="rId42"/>
     <p:sldId id="624" r:id="rId43"/>
-    <p:sldId id="631" r:id="rId44"/>
-    <p:sldId id="614" r:id="rId45"/>
+    <p:sldId id="635" r:id="rId44"/>
+    <p:sldId id="605" r:id="rId45"/>
+    <p:sldId id="606" r:id="rId46"/>
+    <p:sldId id="614" r:id="rId47"/>
   </p:sldIdLst>
   <p:sldSz cx="9144000" cy="6858000" type="screen4x3"/>
   <p:notesSz cx="6997700" cy="9283700"/>
@@ -6856,7 +6858,7 @@
           <a:graphicData uri="http://schemas.openxmlformats.org/presentationml/2006/ole">
             <mc:AlternateContent xmlns:mc="http://schemas.openxmlformats.org/markup-compatibility/2006">
               <mc:Choice xmlns:v="urn:schemas-microsoft-com:vml" Requires="v">
-                <p:oleObj spid="_x0000_s120876" name="Equation" r:id="rId3" imgW="2260440" imgH="457200" progId="Equation.3">
+                <p:oleObj spid="_x0000_s120883" name="Equation" r:id="rId3" imgW="2260440" imgH="457200" progId="Equation.3">
                   <p:embed/>
                 </p:oleObj>
               </mc:Choice>
@@ -8924,7 +8926,7 @@
           <a:graphicData uri="http://schemas.openxmlformats.org/presentationml/2006/ole">
             <mc:AlternateContent xmlns:mc="http://schemas.openxmlformats.org/markup-compatibility/2006">
               <mc:Choice xmlns:v="urn:schemas-microsoft-com:vml" Requires="v">
-                <p:oleObj spid="_x0000_s115778" name="Equation" r:id="rId4" imgW="2146300" imgH="228600" progId="Equation.3">
+                <p:oleObj spid="_x0000_s115785" name="Equation" r:id="rId4" imgW="2146300" imgH="228600" progId="Equation.3">
                   <p:embed/>
                 </p:oleObj>
               </mc:Choice>
@@ -12002,7 +12004,7 @@
           <a:graphicData uri="http://schemas.openxmlformats.org/presentationml/2006/ole">
             <mc:AlternateContent xmlns:mc="http://schemas.openxmlformats.org/markup-compatibility/2006">
               <mc:Choice xmlns:v="urn:schemas-microsoft-com:vml" Requires="v">
-                <p:oleObj spid="_x0000_s122918" name="Equation" r:id="rId5" imgW="2260440" imgH="228600" progId="Equation.3">
+                <p:oleObj spid="_x0000_s122925" name="Equation" r:id="rId5" imgW="2260440" imgH="228600" progId="Equation.3">
                   <p:embed/>
                 </p:oleObj>
               </mc:Choice>
@@ -12111,7 +12113,12 @@
             <p:ph idx="1"/>
           </p:nvPr>
         </p:nvSpPr>
-        <p:spPr/>
+        <p:spPr>
+          <a:xfrm>
+            <a:off x="457200" y="1328351"/>
+            <a:ext cx="8229600" cy="4525963"/>
+          </a:xfrm>
+        </p:spPr>
         <p:txBody>
           <a:bodyPr/>
           <a:lstStyle/>
@@ -12125,15 +12132,20 @@
               <a:t>arima</a:t>
             </a:r>
             <a:r>
-              <a:rPr lang="en-US" sz="2800"/>
+              <a:rPr lang="en-US" sz="2800" dirty="0"/>
               <a:t>(), Arima().</a:t>
             </a:r>
-            <a:endParaRPr lang="en-US" sz="2800" dirty="0"/>
           </a:p>
           <a:p>
             <a:r>
               <a:rPr lang="en-US" sz="2800" dirty="0"/>
-              <a:t>Seasonal ARIMA has effect of Jan (or Feb …) in year t on Jan (or Feb …) in year t+1.  Not the type of seasonality we run into typically when working with population data.</a:t>
+              <a:t>Seasonal ARIMA has effect of Jan (or Feb …) in year t on Jan (or Feb …) in year t+1.  Not typical when working with population data.</a:t>
+            </a:r>
+          </a:p>
+          <a:p>
+            <a:r>
+              <a:rPr lang="en-US" sz="2800" dirty="0"/>
+              <a:t>Removing the mean season is different than a seasonal difference.</a:t>
             </a:r>
           </a:p>
           <a:p>
@@ -12160,7 +12172,7 @@
         </p:nvSpPr>
         <p:spPr bwMode="auto">
           <a:xfrm>
-            <a:off x="401670" y="1564759"/>
+            <a:off x="457200" y="1156986"/>
             <a:ext cx="8489950" cy="44450"/>
           </a:xfrm>
           <a:prstGeom prst="rect">
@@ -13851,22 +13863,13 @@
               <a:buNone/>
             </a:pPr>
             <a:r>
-              <a:rPr lang="en-US" altLang="en-US" sz="2800">
+              <a:rPr lang="en-US" altLang="en-US" sz="2800" dirty="0">
                 <a:solidFill>
                   <a:schemeClr val="tx2"/>
                 </a:solidFill>
                 <a:latin typeface="Calibri" panose="020F0502020204030204" pitchFamily="34" charset="0"/>
               </a:rPr>
-              <a:t>One use </a:t>
-            </a:r>
-            <a:r>
-              <a:rPr lang="en-US" altLang="en-US" sz="2800" dirty="0">
-                <a:solidFill>
-                  <a:schemeClr val="tx2"/>
-                </a:solidFill>
-                <a:latin typeface="Calibri" panose="020F0502020204030204" pitchFamily="34" charset="0"/>
-              </a:rPr>
-              <a:t>of univariate state-space models is “count-based” population viability analysis (chap 6 HWS2014)</a:t>
+              <a:t>One use of univariate state-space models is “count-based” population viability analysis (chap 6 HWS2014)</a:t>
             </a:r>
           </a:p>
         </p:txBody>
@@ -15456,7 +15459,7 @@
           <a:graphicData uri="http://schemas.openxmlformats.org/presentationml/2006/ole">
             <mc:AlternateContent xmlns:mc="http://schemas.openxmlformats.org/markup-compatibility/2006">
               <mc:Choice xmlns:v="urn:schemas-microsoft-com:vml" Requires="v">
-                <p:oleObj spid="_x0000_s116801" name="Equation" r:id="rId3" imgW="1143000" imgH="1371600" progId="Equation.3">
+                <p:oleObj spid="_x0000_s116808" name="Equation" r:id="rId3" imgW="1143000" imgH="1371600" progId="Equation.3">
                   <p:embed/>
                 </p:oleObj>
               </mc:Choice>
@@ -18118,7 +18121,7 @@
                   <a:schemeClr val="tx2"/>
                 </a:solidFill>
               </a:rPr>
-              <a:t>Weeks 1-3: building blocks for analysis of multivariate time-series data with observation error, structure, and missing values</a:t>
+              <a:t>Weeks 1-3.5: building blocks for analysis of multivariate time-series data with observation error, structure, and missing values</a:t>
             </a:r>
           </a:p>
         </p:txBody>
@@ -18133,7 +18136,12 @@
             <p:ph idx="1"/>
           </p:nvPr>
         </p:nvSpPr>
-        <p:spPr/>
+        <p:spPr>
+          <a:xfrm>
+            <a:off x="457200" y="1946189"/>
+            <a:ext cx="8229600" cy="4525963"/>
+          </a:xfrm>
+        </p:spPr>
         <p:txBody>
           <a:bodyPr/>
           <a:lstStyle/>
@@ -18146,23 +18154,13 @@
           <a:p>
             <a:r>
               <a:rPr lang="en-US" sz="2800" dirty="0"/>
-              <a:t>Properties of time series data (AR and MA models)   x(t) = b</a:t>
-            </a:r>
-            <a:r>
-              <a:rPr lang="en-US" sz="2800" baseline="-25000" dirty="0"/>
-              <a:t>1</a:t>
-            </a:r>
+              <a:t>Properties of time series data</a:t>
+            </a:r>
+          </a:p>
+          <a:p>
             <a:r>
               <a:rPr lang="en-US" sz="2800" dirty="0"/>
-              <a:t> x(t-1) + b</a:t>
-            </a:r>
-            <a:r>
-              <a:rPr lang="en-US" sz="2800" baseline="-25000" dirty="0"/>
-              <a:t>2</a:t>
-            </a:r>
-            <a:r>
-              <a:rPr lang="en-US" sz="2800" dirty="0"/>
-              <a:t> x(t-2) + e(t)</a:t>
+              <a:t>AR and MA models</a:t>
             </a:r>
           </a:p>
           <a:p>
@@ -18172,39 +18170,28 @@
             </a:pPr>
             <a:r>
               <a:rPr lang="en-US" sz="2800" dirty="0"/>
-              <a:t>Fitting models and model selection (analysis)</a:t>
-            </a:r>
-          </a:p>
-          <a:p>
-            <a:pPr lvl="1"/>
-            <a:r>
-              <a:rPr lang="en-US" sz="2400" dirty="0"/>
-              <a:t>Bayesian models (non-</a:t>
-            </a:r>
-            <a:r>
-              <a:rPr lang="en-US" sz="2400" dirty="0" err="1"/>
-              <a:t>gaussian</a:t>
-            </a:r>
-            <a:r>
-              <a:rPr lang="en-US" sz="2400" dirty="0"/>
-              <a:t> errors, non-linearity, zeros)</a:t>
+              <a:t>State-space models: observation + process model</a:t>
             </a:r>
           </a:p>
           <a:p>
             <a:pPr>
-              <a:buFont typeface="Wingdings" panose="05000000000000000000" pitchFamily="2" charset="2"/>
-              <a:buChar char="Ø"/>
+              <a:buFont typeface="Arial" panose="020B0604020202020204" pitchFamily="34" charset="0"/>
+              <a:buChar char="•"/>
             </a:pPr>
             <a:r>
               <a:rPr lang="en-US" sz="2800" dirty="0"/>
-              <a:t>State-space models (observation error and missing values)</a:t>
-            </a:r>
-            <a:endParaRPr lang="en-US" dirty="0"/>
-          </a:p>
-          <a:p>
-            <a:pPr marL="0" indent="0" algn="ctr">
-              <a:buNone/>
+              <a:t>Model evaluation and model selection</a:t>
+            </a:r>
+          </a:p>
+          <a:p>
+            <a:pPr>
+              <a:buFont typeface="Arial" panose="020B0604020202020204" pitchFamily="34" charset="0"/>
+              <a:buChar char="•"/>
             </a:pPr>
+            <a:r>
+              <a:rPr lang="en-US" sz="2800" dirty="0"/>
+              <a:t>Fitting models with STAN (non-linear, non-Gaussian, disparate data streams)</a:t>
+            </a:r>
             <a:endParaRPr lang="en-US" sz="1400" dirty="0">
               <a:solidFill>
                 <a:schemeClr val="accent2"/>
@@ -18221,7 +18208,7 @@
                   <a:schemeClr val="accent2"/>
                 </a:solidFill>
               </a:rPr>
-              <a:t>Starting next week: putting this all together to start analyzing ecological data sets</a:t>
+              <a:t>Starting next week: we will put this all together to start analyzing ecological data sets</a:t>
             </a:r>
           </a:p>
         </p:txBody>
@@ -18288,68 +18275,6 @@
           </a:p>
         </p:txBody>
       </p:sp>
-      <p:sp>
-        <p:nvSpPr>
-          <p:cNvPr id="5" name="Rectangle 4"/>
-          <p:cNvSpPr>
-            <a:spLocks noChangeArrowheads="1"/>
-          </p:cNvSpPr>
-          <p:nvPr/>
-        </p:nvSpPr>
-        <p:spPr bwMode="auto">
-          <a:xfrm>
-            <a:off x="401670" y="4964213"/>
-            <a:ext cx="8489950" cy="44450"/>
-          </a:xfrm>
-          <a:prstGeom prst="rect">
-            <a:avLst/>
-          </a:prstGeom>
-          <a:gradFill rotWithShape="1">
-            <a:gsLst>
-              <a:gs pos="0">
-                <a:srgbClr val="9AB5E4"/>
-              </a:gs>
-              <a:gs pos="50000">
-                <a:srgbClr val="C2D1ED"/>
-              </a:gs>
-              <a:gs pos="100000">
-                <a:srgbClr val="E1E8F5"/>
-              </a:gs>
-            </a:gsLst>
-            <a:lin ang="0" scaled="1"/>
-          </a:gradFill>
-          <a:ln w="25400">
-            <a:noFill/>
-            <a:miter lim="800000"/>
-            <a:headEnd/>
-            <a:tailEnd/>
-          </a:ln>
-          <a:effectLst>
-            <a:outerShdw blurRad="63500" dist="38100" dir="2700000" algn="tl" rotWithShape="0">
-              <a:srgbClr val="000000">
-                <a:alpha val="39999"/>
-              </a:srgbClr>
-            </a:outerShdw>
-          </a:effectLst>
-        </p:spPr>
-        <p:txBody>
-          <a:bodyPr anchor="ctr"/>
-          <a:lstStyle/>
-          <a:p>
-            <a:pPr algn="ctr">
-              <a:defRPr/>
-            </a:pPr>
-            <a:endParaRPr lang="en-US">
-              <a:solidFill>
-                <a:prstClr val="white"/>
-              </a:solidFill>
-              <a:latin typeface="+mn-lt"/>
-              <a:ea typeface="+mn-ea"/>
-              <a:cs typeface="+mn-cs"/>
-            </a:endParaRPr>
-          </a:p>
-        </p:txBody>
-      </p:sp>
     </p:spTree>
     <p:extLst>
       <p:ext uri="{BB962C8B-B14F-4D97-AF65-F5344CB8AC3E}">
@@ -18770,268 +18695,78 @@
       </p:grpSpPr>
       <p:sp>
         <p:nvSpPr>
-          <p:cNvPr id="3" name="Content Placeholder 2"/>
+          <p:cNvPr id="2" name="Title 1"/>
           <p:cNvSpPr>
             <a:spLocks noGrp="1"/>
           </p:cNvSpPr>
           <p:nvPr>
-            <p:ph idx="1"/>
+            <p:ph type="title"/>
           </p:nvPr>
         </p:nvSpPr>
         <p:spPr>
           <a:xfrm>
-            <a:off x="634482" y="732454"/>
-            <a:ext cx="8229600" cy="4525963"/>
+            <a:off x="0" y="-23812"/>
+            <a:ext cx="9144000" cy="1143000"/>
           </a:xfrm>
         </p:spPr>
         <p:txBody>
           <a:bodyPr/>
           <a:lstStyle/>
           <a:p>
-            <a:endParaRPr lang="en-US" sz="1400" dirty="0"/>
-          </a:p>
-          <a:p>
-            <a:pPr marL="0" indent="0">
-              <a:buNone/>
-            </a:pPr>
-            <a:endParaRPr lang="en-US" sz="1800" dirty="0"/>
-          </a:p>
-          <a:p>
-            <a:pPr marL="0" indent="0">
-              <a:buNone/>
-            </a:pPr>
-            <a:r>
-              <a:rPr lang="en-US" sz="2000" dirty="0"/>
-              <a:t>X(t) = </a:t>
-            </a:r>
-            <a:r>
-              <a:rPr lang="en-US" sz="2000" b="1" dirty="0">
-                <a:solidFill>
-                  <a:srgbClr val="FF0000"/>
-                </a:solidFill>
+            <a:r>
+              <a:rPr lang="en-US" sz="4000" dirty="0">
+                <a:solidFill>
+                  <a:schemeClr val="tx2"/>
+                </a:solidFill>
+                <a:latin typeface="+mn-lt"/>
               </a:rPr>
-              <a:t>B</a:t>
-            </a:r>
-            <a:r>
-              <a:rPr lang="en-US" sz="2000" dirty="0"/>
-              <a:t> X(t-1) + </a:t>
-            </a:r>
-            <a:r>
-              <a:rPr lang="en-US" sz="2000" b="1" dirty="0">
-                <a:solidFill>
-                  <a:srgbClr val="FF0000"/>
-                </a:solidFill>
-              </a:rPr>
-              <a:t>U</a:t>
-            </a:r>
-            <a:r>
-              <a:rPr lang="en-US" sz="2000" dirty="0"/>
-              <a:t> + w(t), w(t) ~ N(0, </a:t>
-            </a:r>
-            <a:r>
-              <a:rPr lang="en-US" sz="2000" b="1" dirty="0">
-                <a:solidFill>
-                  <a:srgbClr val="FF0000"/>
-                </a:solidFill>
-              </a:rPr>
-              <a:t>Q</a:t>
-            </a:r>
-            <a:r>
-              <a:rPr lang="en-US" sz="2000" dirty="0"/>
-              <a:t>)</a:t>
-            </a:r>
-          </a:p>
-          <a:p>
-            <a:pPr marL="0" indent="0">
-              <a:buNone/>
-            </a:pPr>
-            <a:r>
-              <a:rPr lang="en-US" sz="2000" dirty="0"/>
-              <a:t>Y(t) = </a:t>
-            </a:r>
-            <a:r>
-              <a:rPr lang="en-US" sz="2000" b="1" dirty="0">
-                <a:solidFill>
-                  <a:srgbClr val="FF0000"/>
-                </a:solidFill>
-              </a:rPr>
-              <a:t>Z</a:t>
-            </a:r>
-            <a:r>
-              <a:rPr lang="en-US" sz="2000" dirty="0"/>
-              <a:t> X(t) + </a:t>
-            </a:r>
-            <a:r>
-              <a:rPr lang="en-US" sz="2000" b="1" dirty="0">
-                <a:solidFill>
-                  <a:srgbClr val="FF0000"/>
-                </a:solidFill>
-              </a:rPr>
-              <a:t>A</a:t>
-            </a:r>
-            <a:r>
-              <a:rPr lang="en-US" sz="2000" dirty="0"/>
-              <a:t> + v(t), v(t) ~ N(0,</a:t>
-            </a:r>
-            <a:r>
-              <a:rPr lang="en-US" sz="2000" b="1" dirty="0">
-                <a:solidFill>
-                  <a:srgbClr val="FF0000"/>
-                </a:solidFill>
-              </a:rPr>
-              <a:t>R</a:t>
-            </a:r>
-            <a:r>
-              <a:rPr lang="en-US" sz="2000" dirty="0"/>
-              <a:t>)</a:t>
-            </a:r>
-          </a:p>
-          <a:p>
-            <a:endParaRPr lang="en-US" sz="1400" dirty="0"/>
-          </a:p>
-          <a:p>
-            <a:pPr marL="0" indent="0">
-              <a:buNone/>
-            </a:pPr>
-            <a:endParaRPr lang="en-US" sz="1400" dirty="0"/>
-          </a:p>
-          <a:p>
-            <a:pPr marL="0" indent="0">
-              <a:buNone/>
-            </a:pPr>
-            <a:r>
-              <a:rPr lang="en-US" sz="2000" dirty="0" err="1"/>
-              <a:t>mod.list</a:t>
-            </a:r>
-            <a:r>
-              <a:rPr lang="en-US" sz="2000" dirty="0"/>
-              <a:t>=list(</a:t>
-            </a:r>
-          </a:p>
-          <a:p>
-            <a:pPr marL="0" indent="0">
-              <a:buNone/>
-            </a:pPr>
-            <a:r>
-              <a:rPr lang="en-US" sz="2000" dirty="0"/>
-              <a:t>  U=matrix(“u"),</a:t>
-            </a:r>
-          </a:p>
-          <a:p>
-            <a:pPr marL="0" indent="0">
-              <a:buNone/>
-            </a:pPr>
-            <a:r>
-              <a:rPr lang="en-US" sz="2000" dirty="0"/>
-              <a:t>  x0=matrix(0),</a:t>
-            </a:r>
-          </a:p>
-          <a:p>
-            <a:pPr marL="0" indent="0">
-              <a:buNone/>
-            </a:pPr>
-            <a:r>
-              <a:rPr lang="en-US" sz="2000" dirty="0"/>
-              <a:t>  B=matrix(1),</a:t>
-            </a:r>
-          </a:p>
-          <a:p>
-            <a:pPr marL="0" indent="0">
-              <a:buNone/>
-            </a:pPr>
-            <a:r>
-              <a:rPr lang="en-US" sz="2000" dirty="0"/>
-              <a:t>  Q=matrix(0.1),</a:t>
-            </a:r>
-          </a:p>
-          <a:p>
-            <a:pPr marL="0" indent="0">
-              <a:buNone/>
-            </a:pPr>
-            <a:r>
-              <a:rPr lang="en-US" sz="2000" dirty="0"/>
-              <a:t>  Z=matrix(1),</a:t>
-            </a:r>
-          </a:p>
-          <a:p>
-            <a:pPr marL="0" indent="0">
-              <a:buNone/>
-            </a:pPr>
-            <a:r>
-              <a:rPr lang="en-US" sz="2000" dirty="0"/>
-              <a:t>  A=matrix(0),</a:t>
-            </a:r>
-          </a:p>
-          <a:p>
-            <a:pPr marL="0" indent="0">
-              <a:buNone/>
-            </a:pPr>
-            <a:r>
-              <a:rPr lang="en-US" sz="2000" dirty="0"/>
-              <a:t>  R=matrix("r"),</a:t>
-            </a:r>
-          </a:p>
-          <a:p>
-            <a:pPr marL="0" indent="0">
-              <a:buNone/>
-            </a:pPr>
-            <a:r>
-              <a:rPr lang="en-US" sz="2000" dirty="0"/>
-              <a:t>  </a:t>
-            </a:r>
-            <a:r>
-              <a:rPr lang="en-US" sz="2000" dirty="0" err="1"/>
-              <a:t>tinitx</a:t>
-            </a:r>
-            <a:r>
-              <a:rPr lang="en-US" sz="2000" dirty="0"/>
-              <a:t>=0)</a:t>
-            </a:r>
-          </a:p>
-          <a:p>
-            <a:endParaRPr lang="en-US" dirty="0"/>
+              <a:t>MARSS model in matrix form </a:t>
+            </a:r>
           </a:p>
         </p:txBody>
       </p:sp>
       <p:graphicFrame>
         <p:nvGraphicFramePr>
-          <p:cNvPr id="5" name="Object 4"/>
+          <p:cNvPr id="4" name="Content Placeholder 3"/>
           <p:cNvGraphicFramePr>
             <a:graphicFrameLocks noGrp="1" noChangeAspect="1"/>
           </p:cNvGraphicFramePr>
           <p:nvPr>
-            <p:extLst>
-              <p:ext uri="{D42A27DB-BD31-4B8C-83A1-F6EECF244321}">
-                <p14:modId xmlns:p14="http://schemas.microsoft.com/office/powerpoint/2010/main" val="713720261"/>
-              </p:ext>
-            </p:extLst>
+            <p:ph idx="1"/>
+            <p:extLst/>
           </p:nvPr>
         </p:nvGraphicFramePr>
         <p:xfrm>
-          <a:off x="2960688" y="3081400"/>
-          <a:ext cx="5828749" cy="2571687"/>
+          <a:off x="1541111" y="2276669"/>
+          <a:ext cx="5884113" cy="2693226"/>
         </p:xfrm>
         <a:graphic>
           <a:graphicData uri="http://schemas.openxmlformats.org/presentationml/2006/ole">
             <mc:AlternateContent xmlns:mc="http://schemas.openxmlformats.org/markup-compatibility/2006">
               <mc:Choice xmlns:v="urn:schemas-microsoft-com:vml" Requires="v">
-                <p:oleObj spid="_x0000_s124954" name="Equation" r:id="rId3" imgW="2234880" imgH="698400" progId="Equation.3">
+                <p:oleObj spid="_x0000_s140291" name="Equation" r:id="rId3" imgW="2552700" imgH="1168400" progId="Equation.3">
                   <p:embed/>
                 </p:oleObj>
               </mc:Choice>
               <mc:Fallback>
-                <p:oleObj name="Equation" r:id="rId3" imgW="2234880" imgH="698400" progId="Equation.3">
+                <p:oleObj name="Equation" r:id="rId3" imgW="2552700" imgH="1168400" progId="Equation.3">
                   <p:embed/>
                   <p:pic>
                     <p:nvPicPr>
-                      <p:cNvPr id="0" name="Content Placeholder 3"/>
+                      <p:cNvPr id="4" name="Content Placeholder 3"/>
                       <p:cNvPicPr>
-                        <a:picLocks noGrp="1" noChangeAspect="1" noChangeArrowheads="1"/>
+                        <a:picLocks noChangeAspect="1" noChangeArrowheads="1"/>
                       </p:cNvPicPr>
                       <p:nvPr/>
                     </p:nvPicPr>
                     <p:blipFill>
-                      <a:blip r:embed="rId4"/>
+                      <a:blip r:embed="rId4">
+                        <a:extLst>
+                          <a:ext uri="{28A0092B-C50C-407E-A947-70E740481C1C}">
+                            <a14:useLocalDpi xmlns:a14="http://schemas.microsoft.com/office/drawing/2010/main" val="0"/>
+                          </a:ext>
+                        </a:extLst>
+                      </a:blip>
                       <a:srcRect/>
                       <a:stretch>
                         <a:fillRect/>
@@ -19039,8 +18774,8 @@
                     </p:blipFill>
                     <p:spPr bwMode="auto">
                       <a:xfrm>
-                        <a:off x="2960688" y="3081400"/>
-                        <a:ext cx="5828749" cy="2571687"/>
+                        <a:off x="1541111" y="2276669"/>
+                        <a:ext cx="5884113" cy="2693226"/>
                       </a:xfrm>
                       <a:prstGeom prst="rect">
                         <a:avLst/>
@@ -19049,6 +18784,7 @@
                       <a:ln>
                         <a:noFill/>
                       </a:ln>
+                      <a:effectLst/>
                     </p:spPr>
                   </p:pic>
                 </p:oleObj>
@@ -19059,224 +18795,7 @@
       </p:graphicFrame>
       <p:sp>
         <p:nvSpPr>
-          <p:cNvPr id="7" name="TextBox 6"/>
-          <p:cNvSpPr txBox="1"/>
-          <p:nvPr/>
-        </p:nvSpPr>
-        <p:spPr>
-          <a:xfrm>
-            <a:off x="4030825" y="2407298"/>
-            <a:ext cx="3681457" cy="369332"/>
-          </a:xfrm>
-          <a:prstGeom prst="rect">
-            <a:avLst/>
-          </a:prstGeom>
-          <a:noFill/>
-        </p:spPr>
-        <p:txBody>
-          <a:bodyPr wrap="none" rtlCol="0">
-            <a:spAutoFit/>
-          </a:bodyPr>
-          <a:lstStyle/>
-          <a:p>
-            <a:r>
-              <a:rPr lang="en-US" dirty="0"/>
-              <a:t>Let’s say we want to fit this model:</a:t>
-            </a:r>
-          </a:p>
-        </p:txBody>
-      </p:sp>
-    </p:spTree>
-    <p:extLst>
-      <p:ext uri="{BB962C8B-B14F-4D97-AF65-F5344CB8AC3E}">
-        <p14:creationId xmlns:p14="http://schemas.microsoft.com/office/powerpoint/2010/main" val="1919547820"/>
-      </p:ext>
-    </p:extLst>
-  </p:cSld>
-  <p:clrMapOvr>
-    <a:masterClrMapping/>
-  </p:clrMapOvr>
-</p:sld>
-</file>
-
-<file path=ppt/slides/slide33.xml><?xml version="1.0" encoding="utf-8"?>
-<p:sld xmlns:a="http://schemas.openxmlformats.org/drawingml/2006/main" xmlns:r="http://schemas.openxmlformats.org/officeDocument/2006/relationships" xmlns:p="http://schemas.openxmlformats.org/presentationml/2006/main">
-  <p:cSld>
-    <p:spTree>
-      <p:nvGrpSpPr>
-        <p:cNvPr id="1" name=""/>
-        <p:cNvGrpSpPr/>
-        <p:nvPr/>
-      </p:nvGrpSpPr>
-      <p:grpSpPr>
-        <a:xfrm>
-          <a:off x="0" y="0"/>
-          <a:ext cx="0" cy="0"/>
-          <a:chOff x="0" y="0"/>
-          <a:chExt cx="0" cy="0"/>
-        </a:xfrm>
-      </p:grpSpPr>
-      <p:sp>
-        <p:nvSpPr>
-          <p:cNvPr id="23554" name="Rectangle 2"/>
-          <p:cNvSpPr>
-            <a:spLocks noGrp="1" noChangeArrowheads="1"/>
-          </p:cNvSpPr>
-          <p:nvPr>
-            <p:ph type="title"/>
-          </p:nvPr>
-        </p:nvSpPr>
-        <p:spPr>
-          <a:xfrm>
-            <a:off x="475860" y="0"/>
-            <a:ext cx="8192279" cy="1143000"/>
-          </a:xfrm>
-        </p:spPr>
-        <p:txBody>
-          <a:bodyPr/>
-          <a:lstStyle/>
-          <a:p>
-            <a:pPr eaLnBrk="1" hangingPunct="1"/>
-            <a:r>
-              <a:rPr lang="en-US" altLang="en-US" sz="2800" dirty="0">
-                <a:solidFill>
-                  <a:schemeClr val="tx2"/>
-                </a:solidFill>
-                <a:latin typeface="Calibri" panose="020F0502020204030204" pitchFamily="34" charset="0"/>
-              </a:rPr>
-              <a:t>How do you know when to use a process error or observation error model?</a:t>
-            </a:r>
-          </a:p>
-        </p:txBody>
-      </p:sp>
-      <p:sp>
-        <p:nvSpPr>
-          <p:cNvPr id="23555" name="Rectangle 3"/>
-          <p:cNvSpPr>
-            <a:spLocks noGrp="1" noChangeArrowheads="1"/>
-          </p:cNvSpPr>
-          <p:nvPr>
-            <p:ph idx="1"/>
-          </p:nvPr>
-        </p:nvSpPr>
-        <p:spPr>
-          <a:xfrm>
-            <a:off x="533400" y="1447800"/>
-            <a:ext cx="8229600" cy="4953000"/>
-          </a:xfrm>
-        </p:spPr>
-        <p:txBody>
-          <a:bodyPr/>
-          <a:lstStyle/>
-          <a:p>
-            <a:pPr eaLnBrk="1" hangingPunct="1">
-              <a:lnSpc>
-                <a:spcPct val="90000"/>
-              </a:lnSpc>
-              <a:buFont typeface="Arial" panose="020B0604020202020204" pitchFamily="34" charset="0"/>
-              <a:buChar char="•"/>
-            </a:pPr>
-            <a:r>
-              <a:rPr lang="en-US" altLang="en-US" sz="2400" dirty="0"/>
-              <a:t>If your time-series data contain both types, use a model with both types.</a:t>
-            </a:r>
-          </a:p>
-          <a:p>
-            <a:pPr eaLnBrk="1" hangingPunct="1">
-              <a:lnSpc>
-                <a:spcPct val="90000"/>
-              </a:lnSpc>
-              <a:buFont typeface="Arial" panose="020B0604020202020204" pitchFamily="34" charset="0"/>
-              <a:buChar char="•"/>
-            </a:pPr>
-            <a:endParaRPr lang="en-US" altLang="en-US" sz="2400" dirty="0"/>
-          </a:p>
-          <a:p>
-            <a:pPr eaLnBrk="1" hangingPunct="1">
-              <a:lnSpc>
-                <a:spcPct val="90000"/>
-              </a:lnSpc>
-              <a:buFont typeface="Arial" panose="020B0604020202020204" pitchFamily="34" charset="0"/>
-              <a:buChar char="•"/>
-            </a:pPr>
-            <a:r>
-              <a:rPr lang="en-US" altLang="en-US" sz="2400" dirty="0"/>
-              <a:t>To estimate both variances, you need a) 20+ time steps </a:t>
-            </a:r>
-            <a:r>
-              <a:rPr lang="en-US" altLang="en-US" sz="2400" b="1" dirty="0"/>
-              <a:t>OR</a:t>
-            </a:r>
-            <a:r>
-              <a:rPr lang="en-US" altLang="en-US" sz="2400" dirty="0"/>
-              <a:t> b) multi-site data.  </a:t>
-            </a:r>
-          </a:p>
-          <a:p>
-            <a:pPr eaLnBrk="1" hangingPunct="1">
-              <a:lnSpc>
-                <a:spcPct val="90000"/>
-              </a:lnSpc>
-              <a:buFont typeface="Arial" panose="020B0604020202020204" pitchFamily="34" charset="0"/>
-              <a:buChar char="•"/>
-            </a:pPr>
-            <a:endParaRPr lang="en-US" altLang="en-US" sz="2400" dirty="0">
-              <a:solidFill>
-                <a:srgbClr val="0000FF"/>
-              </a:solidFill>
-            </a:endParaRPr>
-          </a:p>
-          <a:p>
-            <a:pPr eaLnBrk="1" hangingPunct="1">
-              <a:lnSpc>
-                <a:spcPct val="90000"/>
-              </a:lnSpc>
-              <a:buFont typeface="Arial" panose="020B0604020202020204" pitchFamily="34" charset="0"/>
-              <a:buChar char="•"/>
-            </a:pPr>
-            <a:r>
-              <a:rPr lang="en-US" altLang="en-US" sz="2400" dirty="0"/>
-              <a:t>If you don’t have enough data, you need to use assumptions about one of the variances.  Meaning a) fix the value or b) incorporate a prior.</a:t>
-            </a:r>
-          </a:p>
-          <a:p>
-            <a:pPr eaLnBrk="1" hangingPunct="1">
-              <a:lnSpc>
-                <a:spcPct val="90000"/>
-              </a:lnSpc>
-              <a:buFont typeface="Arial" panose="020B0604020202020204" pitchFamily="34" charset="0"/>
-              <a:buChar char="•"/>
-            </a:pPr>
-            <a:endParaRPr lang="en-US" altLang="en-US" sz="2400" dirty="0"/>
-          </a:p>
-          <a:p>
-            <a:pPr eaLnBrk="1" hangingPunct="1">
-              <a:lnSpc>
-                <a:spcPct val="90000"/>
-              </a:lnSpc>
-              <a:buFont typeface="Arial" panose="020B0604020202020204" pitchFamily="34" charset="0"/>
-              <a:buChar char="•"/>
-            </a:pPr>
-            <a:r>
-              <a:rPr lang="en-US" altLang="en-US" sz="2400" dirty="0"/>
-              <a:t>Diagnostics: Observation error induces autocorrelation in the noise of an autoregressive process. Fit a process-error only model (R=0) and check for autocorrelation of residuals</a:t>
-            </a:r>
-            <a:br>
-              <a:rPr lang="en-US" altLang="en-US" sz="2400" dirty="0"/>
-            </a:br>
-            <a:br>
-              <a:rPr lang="en-US" altLang="en-US" sz="2400" dirty="0"/>
-            </a:br>
-            <a:br>
-              <a:rPr lang="en-US" altLang="en-US" sz="2400" dirty="0"/>
-            </a:br>
-            <a:endParaRPr lang="en-US" altLang="en-US" sz="2400" dirty="0"/>
-          </a:p>
-        </p:txBody>
-      </p:sp>
-      <p:sp>
-        <p:nvSpPr>
-          <p:cNvPr id="4" name="Rectangle 3"/>
+          <p:cNvPr id="5" name="Rectangle 4"/>
           <p:cNvSpPr>
             <a:spLocks noChangeArrowheads="1"/>
           </p:cNvSpPr>
@@ -19339,7 +18858,355 @@
     </p:spTree>
     <p:extLst>
       <p:ext uri="{BB962C8B-B14F-4D97-AF65-F5344CB8AC3E}">
-        <p14:creationId xmlns:p14="http://schemas.microsoft.com/office/powerpoint/2010/main" val="4167806049"/>
+        <p14:creationId xmlns:p14="http://schemas.microsoft.com/office/powerpoint/2010/main" val="3210179005"/>
+      </p:ext>
+    </p:extLst>
+  </p:cSld>
+  <p:clrMapOvr>
+    <a:masterClrMapping/>
+  </p:clrMapOvr>
+</p:sld>
+</file>
+
+<file path=ppt/slides/slide33.xml><?xml version="1.0" encoding="utf-8"?>
+<p:sld xmlns:a="http://schemas.openxmlformats.org/drawingml/2006/main" xmlns:r="http://schemas.openxmlformats.org/officeDocument/2006/relationships" xmlns:p="http://schemas.openxmlformats.org/presentationml/2006/main">
+  <p:cSld>
+    <p:spTree>
+      <p:nvGrpSpPr>
+        <p:cNvPr id="1" name=""/>
+        <p:cNvGrpSpPr/>
+        <p:nvPr/>
+      </p:nvGrpSpPr>
+      <p:grpSpPr>
+        <a:xfrm>
+          <a:off x="0" y="0"/>
+          <a:ext cx="0" cy="0"/>
+          <a:chOff x="0" y="0"/>
+          <a:chExt cx="0" cy="0"/>
+        </a:xfrm>
+      </p:grpSpPr>
+      <p:sp>
+        <p:nvSpPr>
+          <p:cNvPr id="3" name="Content Placeholder 2"/>
+          <p:cNvSpPr>
+            <a:spLocks noGrp="1"/>
+          </p:cNvSpPr>
+          <p:nvPr>
+            <p:ph idx="1"/>
+          </p:nvPr>
+        </p:nvSpPr>
+        <p:spPr>
+          <a:xfrm>
+            <a:off x="634482" y="732454"/>
+            <a:ext cx="8229600" cy="4525963"/>
+          </a:xfrm>
+        </p:spPr>
+        <p:txBody>
+          <a:bodyPr/>
+          <a:lstStyle/>
+          <a:p>
+            <a:endParaRPr lang="en-US" sz="1400" dirty="0"/>
+          </a:p>
+          <a:p>
+            <a:pPr marL="0" indent="0">
+              <a:buNone/>
+            </a:pPr>
+            <a:endParaRPr lang="en-US" sz="1800" dirty="0"/>
+          </a:p>
+          <a:p>
+            <a:pPr marL="0" indent="0">
+              <a:buNone/>
+            </a:pPr>
+            <a:r>
+              <a:rPr lang="en-US" sz="2000" dirty="0"/>
+              <a:t>X(t) = </a:t>
+            </a:r>
+            <a:r>
+              <a:rPr lang="en-US" sz="2000" b="1" dirty="0">
+                <a:solidFill>
+                  <a:srgbClr val="FF0000"/>
+                </a:solidFill>
+              </a:rPr>
+              <a:t>B</a:t>
+            </a:r>
+            <a:r>
+              <a:rPr lang="en-US" sz="2000" dirty="0"/>
+              <a:t> X(t-1) + </a:t>
+            </a:r>
+            <a:r>
+              <a:rPr lang="en-US" sz="2000" b="1" dirty="0">
+                <a:solidFill>
+                  <a:srgbClr val="FF0000"/>
+                </a:solidFill>
+              </a:rPr>
+              <a:t>U</a:t>
+            </a:r>
+            <a:r>
+              <a:rPr lang="en-US" sz="2000" dirty="0"/>
+              <a:t> + w(t), w(t) ~ N(0, </a:t>
+            </a:r>
+            <a:r>
+              <a:rPr lang="en-US" sz="2000" b="1" dirty="0">
+                <a:solidFill>
+                  <a:srgbClr val="FF0000"/>
+                </a:solidFill>
+              </a:rPr>
+              <a:t>Q</a:t>
+            </a:r>
+            <a:r>
+              <a:rPr lang="en-US" sz="2000" dirty="0"/>
+              <a:t>)</a:t>
+            </a:r>
+          </a:p>
+          <a:p>
+            <a:pPr marL="0" indent="0">
+              <a:buNone/>
+            </a:pPr>
+            <a:r>
+              <a:rPr lang="en-US" sz="2000" dirty="0"/>
+              <a:t>Y(t) = </a:t>
+            </a:r>
+            <a:r>
+              <a:rPr lang="en-US" sz="2000" b="1" dirty="0">
+                <a:solidFill>
+                  <a:srgbClr val="FF0000"/>
+                </a:solidFill>
+              </a:rPr>
+              <a:t>Z</a:t>
+            </a:r>
+            <a:r>
+              <a:rPr lang="en-US" sz="2000" dirty="0"/>
+              <a:t> X(t) + </a:t>
+            </a:r>
+            <a:r>
+              <a:rPr lang="en-US" sz="2000" b="1" dirty="0">
+                <a:solidFill>
+                  <a:srgbClr val="FF0000"/>
+                </a:solidFill>
+              </a:rPr>
+              <a:t>A</a:t>
+            </a:r>
+            <a:r>
+              <a:rPr lang="en-US" sz="2000" dirty="0"/>
+              <a:t> + v(t), v(t) ~ N(0,</a:t>
+            </a:r>
+            <a:r>
+              <a:rPr lang="en-US" sz="2000" b="1" dirty="0">
+                <a:solidFill>
+                  <a:srgbClr val="FF0000"/>
+                </a:solidFill>
+              </a:rPr>
+              <a:t>R</a:t>
+            </a:r>
+            <a:r>
+              <a:rPr lang="en-US" sz="2000" dirty="0"/>
+              <a:t>)</a:t>
+            </a:r>
+          </a:p>
+          <a:p>
+            <a:endParaRPr lang="en-US" sz="1400" dirty="0"/>
+          </a:p>
+          <a:p>
+            <a:pPr marL="0" indent="0">
+              <a:buNone/>
+            </a:pPr>
+            <a:endParaRPr lang="en-US" sz="1400" dirty="0"/>
+          </a:p>
+          <a:p>
+            <a:pPr marL="0" indent="0">
+              <a:buNone/>
+            </a:pPr>
+            <a:r>
+              <a:rPr lang="en-US" sz="2000" dirty="0" err="1"/>
+              <a:t>mod.list</a:t>
+            </a:r>
+            <a:r>
+              <a:rPr lang="en-US" sz="2000" dirty="0"/>
+              <a:t>=list(</a:t>
+            </a:r>
+          </a:p>
+          <a:p>
+            <a:pPr marL="0" indent="0">
+              <a:buNone/>
+            </a:pPr>
+            <a:r>
+              <a:rPr lang="en-US" sz="2000" dirty="0"/>
+              <a:t>  U=matrix(“u"),</a:t>
+            </a:r>
+          </a:p>
+          <a:p>
+            <a:pPr marL="0" indent="0">
+              <a:buNone/>
+            </a:pPr>
+            <a:r>
+              <a:rPr lang="en-US" sz="2000" dirty="0"/>
+              <a:t>  x0=matrix(0),</a:t>
+            </a:r>
+          </a:p>
+          <a:p>
+            <a:pPr marL="0" indent="0">
+              <a:buNone/>
+            </a:pPr>
+            <a:r>
+              <a:rPr lang="en-US" sz="2000" dirty="0"/>
+              <a:t>  B=matrix(1),</a:t>
+            </a:r>
+          </a:p>
+          <a:p>
+            <a:pPr marL="0" indent="0">
+              <a:buNone/>
+            </a:pPr>
+            <a:r>
+              <a:rPr lang="en-US" sz="2000" dirty="0"/>
+              <a:t>  Q=matrix(0.1),</a:t>
+            </a:r>
+          </a:p>
+          <a:p>
+            <a:pPr marL="0" indent="0">
+              <a:buNone/>
+            </a:pPr>
+            <a:r>
+              <a:rPr lang="en-US" sz="2000" dirty="0"/>
+              <a:t>  Z=matrix(1),</a:t>
+            </a:r>
+          </a:p>
+          <a:p>
+            <a:pPr marL="0" indent="0">
+              <a:buNone/>
+            </a:pPr>
+            <a:r>
+              <a:rPr lang="en-US" sz="2000" dirty="0"/>
+              <a:t>  A=matrix(0),</a:t>
+            </a:r>
+          </a:p>
+          <a:p>
+            <a:pPr marL="0" indent="0">
+              <a:buNone/>
+            </a:pPr>
+            <a:r>
+              <a:rPr lang="en-US" sz="2000" dirty="0"/>
+              <a:t>  R=matrix("r"),</a:t>
+            </a:r>
+          </a:p>
+          <a:p>
+            <a:pPr marL="0" indent="0">
+              <a:buNone/>
+            </a:pPr>
+            <a:r>
+              <a:rPr lang="en-US" sz="2000" dirty="0"/>
+              <a:t>  </a:t>
+            </a:r>
+            <a:r>
+              <a:rPr lang="en-US" sz="2000" dirty="0" err="1"/>
+              <a:t>tinitx</a:t>
+            </a:r>
+            <a:r>
+              <a:rPr lang="en-US" sz="2000" dirty="0"/>
+              <a:t>=0)</a:t>
+            </a:r>
+          </a:p>
+          <a:p>
+            <a:endParaRPr lang="en-US" dirty="0"/>
+          </a:p>
+        </p:txBody>
+      </p:sp>
+      <p:graphicFrame>
+        <p:nvGraphicFramePr>
+          <p:cNvPr id="5" name="Object 4"/>
+          <p:cNvGraphicFramePr>
+            <a:graphicFrameLocks noGrp="1" noChangeAspect="1"/>
+          </p:cNvGraphicFramePr>
+          <p:nvPr>
+            <p:extLst>
+              <p:ext uri="{D42A27DB-BD31-4B8C-83A1-F6EECF244321}">
+                <p14:modId xmlns:p14="http://schemas.microsoft.com/office/powerpoint/2010/main" val="3510260524"/>
+              </p:ext>
+            </p:extLst>
+          </p:nvPr>
+        </p:nvGraphicFramePr>
+        <p:xfrm>
+          <a:off x="2928552" y="3081400"/>
+          <a:ext cx="5860886" cy="2034297"/>
+        </p:xfrm>
+        <a:graphic>
+          <a:graphicData uri="http://schemas.openxmlformats.org/presentationml/2006/ole">
+            <mc:AlternateContent xmlns:mc="http://schemas.openxmlformats.org/markup-compatibility/2006">
+              <mc:Choice xmlns:v="urn:schemas-microsoft-com:vml" Requires="v">
+                <p:oleObj spid="_x0000_s124961" name="Equation" r:id="rId3" imgW="2234880" imgH="698400" progId="Equation.3">
+                  <p:embed/>
+                </p:oleObj>
+              </mc:Choice>
+              <mc:Fallback>
+                <p:oleObj name="Equation" r:id="rId3" imgW="2234880" imgH="698400" progId="Equation.3">
+                  <p:embed/>
+                  <p:pic>
+                    <p:nvPicPr>
+                      <p:cNvPr id="0" name="Content Placeholder 3"/>
+                      <p:cNvPicPr>
+                        <a:picLocks noGrp="1" noChangeAspect="1" noChangeArrowheads="1"/>
+                      </p:cNvPicPr>
+                      <p:nvPr/>
+                    </p:nvPicPr>
+                    <p:blipFill>
+                      <a:blip r:embed="rId4"/>
+                      <a:srcRect/>
+                      <a:stretch>
+                        <a:fillRect/>
+                      </a:stretch>
+                    </p:blipFill>
+                    <p:spPr bwMode="auto">
+                      <a:xfrm>
+                        <a:off x="2928552" y="3081400"/>
+                        <a:ext cx="5860886" cy="2034297"/>
+                      </a:xfrm>
+                      <a:prstGeom prst="rect">
+                        <a:avLst/>
+                      </a:prstGeom>
+                      <a:noFill/>
+                      <a:ln>
+                        <a:noFill/>
+                      </a:ln>
+                    </p:spPr>
+                  </p:pic>
+                </p:oleObj>
+              </mc:Fallback>
+            </mc:AlternateContent>
+          </a:graphicData>
+        </a:graphic>
+      </p:graphicFrame>
+      <p:sp>
+        <p:nvSpPr>
+          <p:cNvPr id="7" name="TextBox 6"/>
+          <p:cNvSpPr txBox="1"/>
+          <p:nvPr/>
+        </p:nvSpPr>
+        <p:spPr>
+          <a:xfrm>
+            <a:off x="4030825" y="2407298"/>
+            <a:ext cx="3681457" cy="369332"/>
+          </a:xfrm>
+          <a:prstGeom prst="rect">
+            <a:avLst/>
+          </a:prstGeom>
+          <a:noFill/>
+        </p:spPr>
+        <p:txBody>
+          <a:bodyPr wrap="none" rtlCol="0">
+            <a:spAutoFit/>
+          </a:bodyPr>
+          <a:lstStyle/>
+          <a:p>
+            <a:r>
+              <a:rPr lang="en-US" dirty="0"/>
+              <a:t>Let’s say we want to fit this model:</a:t>
+            </a:r>
+          </a:p>
+        </p:txBody>
+      </p:sp>
+    </p:spTree>
+    <p:extLst>
+      <p:ext uri="{BB962C8B-B14F-4D97-AF65-F5344CB8AC3E}">
+        <p14:creationId xmlns:p14="http://schemas.microsoft.com/office/powerpoint/2010/main" val="1919547820"/>
       </p:ext>
     </p:extLst>
   </p:cSld>
@@ -19368,9 +19235,9 @@
       </p:grpSpPr>
       <p:sp>
         <p:nvSpPr>
-          <p:cNvPr id="24578" name="Rectangle 2"/>
+          <p:cNvPr id="20482" name="Title 1"/>
           <p:cNvSpPr>
-            <a:spLocks noGrp="1" noChangeArrowheads="1"/>
+            <a:spLocks noGrp="1"/>
           </p:cNvSpPr>
           <p:nvPr>
             <p:ph type="title"/>
@@ -19378,180 +19245,74 @@
         </p:nvSpPr>
         <p:spPr>
           <a:xfrm>
-            <a:off x="466531" y="0"/>
-            <a:ext cx="8136294" cy="1143000"/>
+            <a:off x="438539" y="0"/>
+            <a:ext cx="8229600" cy="1143000"/>
           </a:xfrm>
         </p:spPr>
         <p:txBody>
           <a:bodyPr/>
           <a:lstStyle/>
           <a:p>
-            <a:pPr eaLnBrk="1" hangingPunct="1"/>
             <a:r>
               <a:rPr lang="en-US" altLang="en-US" sz="3600" dirty="0">
                 <a:solidFill>
                   <a:schemeClr val="tx2"/>
                 </a:solidFill>
-                <a:latin typeface="Calibri" panose="020F0502020204030204" pitchFamily="34" charset="0"/>
               </a:rPr>
-              <a:t>Other types of “non-process” error</a:t>
+              <a:t>Let’s simulate and try fitting some models</a:t>
             </a:r>
           </a:p>
         </p:txBody>
       </p:sp>
       <p:sp>
         <p:nvSpPr>
-          <p:cNvPr id="10243" name="Rectangle 3"/>
+          <p:cNvPr id="20483" name="Content Placeholder 2"/>
           <p:cNvSpPr>
-            <a:spLocks noGrp="1" noChangeArrowheads="1"/>
+            <a:spLocks noGrp="1"/>
           </p:cNvSpPr>
           <p:nvPr>
             <p:ph idx="1"/>
           </p:nvPr>
         </p:nvSpPr>
-        <p:spPr>
-          <a:xfrm>
-            <a:off x="228600" y="1371600"/>
-            <a:ext cx="8686800" cy="5105400"/>
-          </a:xfrm>
-        </p:spPr>
+        <p:spPr/>
         <p:txBody>
           <a:bodyPr/>
           <a:lstStyle/>
           <a:p>
-            <a:pPr eaLnBrk="1" hangingPunct="1">
-              <a:lnSpc>
-                <a:spcPct val="80000"/>
-              </a:lnSpc>
-              <a:defRPr/>
-            </a:pPr>
-            <a:r>
-              <a:rPr lang="en-US" sz="2400" dirty="0"/>
-              <a:t>Fluctuations that don’t have “feedback” (variance doesn’t explode)</a:t>
-            </a:r>
-            <a:endParaRPr lang="en-US" sz="1800" dirty="0"/>
-          </a:p>
-          <a:p>
-            <a:pPr marL="457200" lvl="1" indent="0" eaLnBrk="1" hangingPunct="1">
-              <a:lnSpc>
-                <a:spcPct val="80000"/>
-              </a:lnSpc>
-              <a:buFontTx/>
-              <a:buNone/>
-              <a:defRPr/>
-            </a:pPr>
-            <a:endParaRPr lang="en-US" sz="2400" dirty="0"/>
-          </a:p>
-          <a:p>
-            <a:pPr eaLnBrk="1" hangingPunct="1">
-              <a:lnSpc>
-                <a:spcPct val="80000"/>
-              </a:lnSpc>
-              <a:defRPr/>
-            </a:pPr>
-            <a:r>
-              <a:rPr lang="en-US" sz="2400" dirty="0"/>
-              <a:t>Lots of biological processes also create noise that looks like that</a:t>
-            </a:r>
-          </a:p>
-          <a:p>
-            <a:pPr lvl="1" eaLnBrk="1" hangingPunct="1">
-              <a:lnSpc>
-                <a:spcPct val="80000"/>
-              </a:lnSpc>
-              <a:defRPr/>
-            </a:pPr>
-            <a:r>
-              <a:rPr lang="en-US" sz="1800" dirty="0"/>
-              <a:t>age-structure cycles                   o  cyclic variability in fecundity</a:t>
-            </a:r>
-          </a:p>
-          <a:p>
-            <a:pPr lvl="1" eaLnBrk="1" hangingPunct="1">
-              <a:lnSpc>
-                <a:spcPct val="80000"/>
-              </a:lnSpc>
-              <a:defRPr/>
-            </a:pPr>
-            <a:r>
-              <a:rPr lang="en-US" sz="1800" dirty="0"/>
-              <a:t>density-dependence                    o  predator-prey interactions</a:t>
-            </a:r>
-          </a:p>
-          <a:p>
-            <a:pPr lvl="1" eaLnBrk="1" hangingPunct="1">
-              <a:lnSpc>
-                <a:spcPct val="80000"/>
-              </a:lnSpc>
-              <a:defRPr/>
-            </a:pPr>
-            <a:endParaRPr lang="en-US" sz="1800" dirty="0"/>
-          </a:p>
-          <a:p>
-            <a:pPr eaLnBrk="1" hangingPunct="1">
-              <a:lnSpc>
-                <a:spcPct val="80000"/>
-              </a:lnSpc>
-              <a:defRPr/>
-            </a:pPr>
-            <a:r>
-              <a:rPr lang="en-US" sz="2400" dirty="0"/>
-              <a:t>If your model cannot accommodate that cycling, </a:t>
-            </a:r>
-          </a:p>
-          <a:p>
-            <a:pPr lvl="1" eaLnBrk="1" hangingPunct="1">
-              <a:lnSpc>
-                <a:spcPct val="80000"/>
-              </a:lnSpc>
-              <a:defRPr/>
-            </a:pPr>
-            <a:r>
-              <a:rPr lang="en-US" sz="2000" dirty="0"/>
-              <a:t>it tends to get ‘soaked’ up in the ‘non-process’ error component</a:t>
-            </a:r>
-          </a:p>
-          <a:p>
-            <a:pPr lvl="1" eaLnBrk="1" hangingPunct="1">
-              <a:lnSpc>
-                <a:spcPct val="80000"/>
-              </a:lnSpc>
-              <a:defRPr/>
-            </a:pPr>
-            <a:endParaRPr lang="en-US" sz="2000" dirty="0"/>
-          </a:p>
-          <a:p>
-            <a:pPr eaLnBrk="1" hangingPunct="1">
-              <a:lnSpc>
-                <a:spcPct val="80000"/>
-              </a:lnSpc>
-              <a:defRPr/>
-            </a:pPr>
-            <a:r>
-              <a:rPr lang="en-US" sz="2400" dirty="0"/>
-              <a:t>If your model can accommodate that cycling, </a:t>
-            </a:r>
-          </a:p>
-          <a:p>
-            <a:pPr lvl="1" eaLnBrk="1" hangingPunct="1">
-              <a:lnSpc>
-                <a:spcPct val="80000"/>
-              </a:lnSpc>
-              <a:defRPr/>
-            </a:pPr>
-            <a:r>
-              <a:rPr lang="en-US" sz="2000" dirty="0"/>
-              <a:t>estimation of ‘observation error’ variance can be confounded, unless you have long, long datasets or replicates</a:t>
-            </a:r>
-          </a:p>
-          <a:p>
-            <a:pPr lvl="1" eaLnBrk="1" hangingPunct="1">
-              <a:lnSpc>
-                <a:spcPct val="80000"/>
-              </a:lnSpc>
-              <a:defRPr/>
-            </a:pPr>
-            <a:endParaRPr lang="en-US" sz="2400" dirty="0"/>
+            <a:r>
+              <a:rPr lang="en-US" altLang="en-US" dirty="0"/>
+              <a:t>Open up R and follow after me</a:t>
+            </a:r>
+          </a:p>
+          <a:p>
+            <a:r>
+              <a:rPr lang="en-US" altLang="en-US" dirty="0"/>
+              <a:t>univariate_example_1.R</a:t>
+            </a:r>
+          </a:p>
+          <a:p>
+            <a:r>
+              <a:rPr lang="en-US" altLang="en-US" dirty="0"/>
+              <a:t>univariate_example_2.R</a:t>
+            </a:r>
+          </a:p>
+          <a:p>
+            <a:r>
+              <a:rPr lang="en-US" altLang="en-US" dirty="0"/>
+              <a:t>univariate_example_3.R</a:t>
+            </a:r>
+          </a:p>
+          <a:p>
+            <a:endParaRPr lang="en-US" altLang="en-US" dirty="0"/>
+          </a:p>
+          <a:p>
+            <a:endParaRPr lang="en-US" altLang="en-US" dirty="0"/>
+          </a:p>
+          <a:p>
+            <a:endParaRPr lang="en-US" altLang="en-US" dirty="0"/>
+          </a:p>
+          <a:p>
+            <a:endParaRPr lang="en-US" altLang="en-US" dirty="0"/>
           </a:p>
         </p:txBody>
       </p:sp>
@@ -19620,7 +19381,7 @@
     </p:spTree>
     <p:extLst>
       <p:ext uri="{BB962C8B-B14F-4D97-AF65-F5344CB8AC3E}">
-        <p14:creationId xmlns:p14="http://schemas.microsoft.com/office/powerpoint/2010/main" val="4281231748"/>
+        <p14:creationId xmlns:p14="http://schemas.microsoft.com/office/powerpoint/2010/main" val="87505093"/>
       </p:ext>
     </p:extLst>
   </p:cSld>
@@ -19641,7 +19402,7 @@
           </a:blip>
           <a:srcRect/>
           <a:stretch>
-            <a:fillRect l="-17000" r="-17000"/>
+            <a:fillRect/>
           </a:stretch>
         </a:blipFill>
         <a:effectLst/>
@@ -19663,7 +19424,7 @@
       </p:grpSpPr>
       <p:sp>
         <p:nvSpPr>
-          <p:cNvPr id="2" name="Title 1"/>
+          <p:cNvPr id="4" name="Title 1"/>
           <p:cNvSpPr>
             <a:spLocks noGrp="1"/>
           </p:cNvSpPr>
@@ -19673,25 +19434,231 @@
         </p:nvSpPr>
         <p:spPr>
           <a:xfrm>
-            <a:off x="520262" y="243107"/>
-            <a:ext cx="8229600" cy="1143000"/>
+            <a:off x="441434" y="4843849"/>
+            <a:ext cx="8560675" cy="1173892"/>
           </a:xfrm>
+          <a:solidFill>
+            <a:schemeClr val="bg1"/>
+          </a:solidFill>
         </p:spPr>
         <p:txBody>
           <a:bodyPr/>
           <a:lstStyle/>
           <a:p>
             <a:r>
-              <a:rPr lang="en-US" b="1" dirty="0"/>
-              <a:t>Basic diagnostics #1 Plot your residuals</a:t>
-            </a:r>
+              <a:rPr lang="en-US" dirty="0">
+                <a:latin typeface="+mn-lt"/>
+              </a:rPr>
+              <a:t>State-space diagnostics</a:t>
+            </a:r>
+          </a:p>
+        </p:txBody>
+      </p:sp>
+      <p:sp>
+        <p:nvSpPr>
+          <p:cNvPr id="3" name="Title 1">
+            <a:extLst>
+              <a:ext uri="{FF2B5EF4-FFF2-40B4-BE49-F238E27FC236}">
+                <a16:creationId xmlns:a16="http://schemas.microsoft.com/office/drawing/2014/main" id="{10EFE1BC-758C-D54D-9DAF-45E38D1CDB35}"/>
+              </a:ext>
+            </a:extLst>
+          </p:cNvPr>
+          <p:cNvSpPr txBox="1">
+            <a:spLocks/>
+          </p:cNvSpPr>
+          <p:nvPr/>
+        </p:nvSpPr>
+        <p:spPr bwMode="auto">
+          <a:xfrm>
+            <a:off x="404364" y="4732639"/>
+            <a:ext cx="8560675" cy="1651544"/>
+          </a:xfrm>
+          <a:prstGeom prst="rect">
+            <a:avLst/>
+          </a:prstGeom>
+          <a:solidFill>
+            <a:schemeClr val="bg1"/>
+          </a:solidFill>
+          <a:ln>
+            <a:noFill/>
+          </a:ln>
+          <a:extLst>
+            <a:ext uri="{91240B29-F687-4F45-9708-019B960494DF}">
+              <a14:hiddenLine xmlns:a14="http://schemas.microsoft.com/office/drawing/2010/main" w="9525">
+                <a:solidFill>
+                  <a:srgbClr val="000000"/>
+                </a:solidFill>
+                <a:miter lim="800000"/>
+                <a:headEnd/>
+                <a:tailEnd/>
+              </a14:hiddenLine>
+            </a:ext>
+            <a:ext uri="{FAA26D3D-D897-4be2-8F04-BA451C77F1D7}">
+              <ma14:placeholderFlag xmlns="" xmlns:ma14="http://schemas.microsoft.com/office/mac/drawingml/2011/main" val="1"/>
+            </a:ext>
+          </a:extLst>
+        </p:spPr>
+        <p:txBody>
+          <a:bodyPr vert="horz" wrap="square" lIns="91440" tIns="45720" rIns="91440" bIns="45720" numCol="1" anchor="ctr" anchorCtr="0" compatLnSpc="1">
+            <a:prstTxWarp prst="textNoShape">
+              <a:avLst/>
+            </a:prstTxWarp>
+          </a:bodyPr>
+          <a:lstStyle>
+            <a:lvl1pPr algn="ctr" rtl="0" eaLnBrk="0" fontAlgn="base" hangingPunct="0">
+              <a:spcBef>
+                <a:spcPct val="0"/>
+              </a:spcBef>
+              <a:spcAft>
+                <a:spcPct val="0"/>
+              </a:spcAft>
+              <a:defRPr sz="4400" kern="1200">
+                <a:solidFill>
+                  <a:schemeClr val="tx1"/>
+                </a:solidFill>
+                <a:latin typeface="+mj-lt"/>
+                <a:ea typeface="ＭＳ Ｐゴシック" charset="-128"/>
+                <a:cs typeface="ＭＳ Ｐゴシック" charset="-128"/>
+              </a:defRPr>
+            </a:lvl1pPr>
+            <a:lvl2pPr algn="ctr" rtl="0" eaLnBrk="0" fontAlgn="base" hangingPunct="0">
+              <a:spcBef>
+                <a:spcPct val="0"/>
+              </a:spcBef>
+              <a:spcAft>
+                <a:spcPct val="0"/>
+              </a:spcAft>
+              <a:defRPr sz="4400">
+                <a:solidFill>
+                  <a:schemeClr val="tx1"/>
+                </a:solidFill>
+                <a:latin typeface="Calibri" pitchFamily="34" charset="0"/>
+                <a:ea typeface="ＭＳ Ｐゴシック" charset="-128"/>
+                <a:cs typeface="ＭＳ Ｐゴシック" charset="-128"/>
+              </a:defRPr>
+            </a:lvl2pPr>
+            <a:lvl3pPr algn="ctr" rtl="0" eaLnBrk="0" fontAlgn="base" hangingPunct="0">
+              <a:spcBef>
+                <a:spcPct val="0"/>
+              </a:spcBef>
+              <a:spcAft>
+                <a:spcPct val="0"/>
+              </a:spcAft>
+              <a:defRPr sz="4400">
+                <a:solidFill>
+                  <a:schemeClr val="tx1"/>
+                </a:solidFill>
+                <a:latin typeface="Calibri" pitchFamily="34" charset="0"/>
+                <a:ea typeface="ＭＳ Ｐゴシック" charset="-128"/>
+                <a:cs typeface="ＭＳ Ｐゴシック" charset="-128"/>
+              </a:defRPr>
+            </a:lvl3pPr>
+            <a:lvl4pPr algn="ctr" rtl="0" eaLnBrk="0" fontAlgn="base" hangingPunct="0">
+              <a:spcBef>
+                <a:spcPct val="0"/>
+              </a:spcBef>
+              <a:spcAft>
+                <a:spcPct val="0"/>
+              </a:spcAft>
+              <a:defRPr sz="4400">
+                <a:solidFill>
+                  <a:schemeClr val="tx1"/>
+                </a:solidFill>
+                <a:latin typeface="Calibri" pitchFamily="34" charset="0"/>
+                <a:ea typeface="ＭＳ Ｐゴシック" charset="-128"/>
+                <a:cs typeface="ＭＳ Ｐゴシック" charset="-128"/>
+              </a:defRPr>
+            </a:lvl4pPr>
+            <a:lvl5pPr algn="ctr" rtl="0" eaLnBrk="0" fontAlgn="base" hangingPunct="0">
+              <a:spcBef>
+                <a:spcPct val="0"/>
+              </a:spcBef>
+              <a:spcAft>
+                <a:spcPct val="0"/>
+              </a:spcAft>
+              <a:defRPr sz="4400">
+                <a:solidFill>
+                  <a:schemeClr val="tx1"/>
+                </a:solidFill>
+                <a:latin typeface="Calibri" pitchFamily="34" charset="0"/>
+                <a:ea typeface="ＭＳ Ｐゴシック" charset="-128"/>
+                <a:cs typeface="ＭＳ Ｐゴシック" charset="-128"/>
+              </a:defRPr>
+            </a:lvl5pPr>
+            <a:lvl6pPr marL="457200" algn="ctr" rtl="0" fontAlgn="base">
+              <a:spcBef>
+                <a:spcPct val="0"/>
+              </a:spcBef>
+              <a:spcAft>
+                <a:spcPct val="0"/>
+              </a:spcAft>
+              <a:defRPr sz="4400">
+                <a:solidFill>
+                  <a:schemeClr val="tx1"/>
+                </a:solidFill>
+                <a:latin typeface="Calibri" pitchFamily="34" charset="0"/>
+              </a:defRPr>
+            </a:lvl6pPr>
+            <a:lvl7pPr marL="914400" algn="ctr" rtl="0" fontAlgn="base">
+              <a:spcBef>
+                <a:spcPct val="0"/>
+              </a:spcBef>
+              <a:spcAft>
+                <a:spcPct val="0"/>
+              </a:spcAft>
+              <a:defRPr sz="4400">
+                <a:solidFill>
+                  <a:schemeClr val="tx1"/>
+                </a:solidFill>
+                <a:latin typeface="Calibri" pitchFamily="34" charset="0"/>
+              </a:defRPr>
+            </a:lvl7pPr>
+            <a:lvl8pPr marL="1371600" algn="ctr" rtl="0" fontAlgn="base">
+              <a:spcBef>
+                <a:spcPct val="0"/>
+              </a:spcBef>
+              <a:spcAft>
+                <a:spcPct val="0"/>
+              </a:spcAft>
+              <a:defRPr sz="4400">
+                <a:solidFill>
+                  <a:schemeClr val="tx1"/>
+                </a:solidFill>
+                <a:latin typeface="Calibri" pitchFamily="34" charset="0"/>
+              </a:defRPr>
+            </a:lvl8pPr>
+            <a:lvl9pPr marL="1828800" algn="ctr" rtl="0" fontAlgn="base">
+              <a:spcBef>
+                <a:spcPct val="0"/>
+              </a:spcBef>
+              <a:spcAft>
+                <a:spcPct val="0"/>
+              </a:spcAft>
+              <a:defRPr sz="4400">
+                <a:solidFill>
+                  <a:schemeClr val="tx1"/>
+                </a:solidFill>
+                <a:latin typeface="Calibri" pitchFamily="34" charset="0"/>
+              </a:defRPr>
+            </a:lvl9pPr>
+          </a:lstStyle>
+          <a:p>
+            <a:r>
+              <a:rPr lang="en-US">
+                <a:latin typeface="+mn-lt"/>
+              </a:rPr>
+              <a:t>State-space diagnostics</a:t>
+            </a:r>
+            <a:endParaRPr lang="en-US" dirty="0">
+              <a:latin typeface="+mn-lt"/>
+            </a:endParaRPr>
           </a:p>
         </p:txBody>
       </p:sp>
     </p:spTree>
     <p:extLst>
       <p:ext uri="{BB962C8B-B14F-4D97-AF65-F5344CB8AC3E}">
-        <p14:creationId xmlns:p14="http://schemas.microsoft.com/office/powerpoint/2010/main" val="736166490"/>
+        <p14:creationId xmlns:p14="http://schemas.microsoft.com/office/powerpoint/2010/main" val="545414265"/>
       </p:ext>
     </p:extLst>
   </p:cSld>
@@ -20292,7 +20259,7 @@
                 </a:solidFill>
                 <a:latin typeface="Calibri" panose="020F0502020204030204" pitchFamily="34" charset="0"/>
               </a:rPr>
-              <a:t>Basic diagnostics: plot the residuals</a:t>
+              <a:t>Basic diagnostics: #1 plot the residuals</a:t>
             </a:r>
           </a:p>
         </p:txBody>
@@ -22257,7 +22224,7 @@
           <a:graphicData uri="http://schemas.openxmlformats.org/presentationml/2006/ole">
             <mc:AlternateContent xmlns:mc="http://schemas.openxmlformats.org/markup-compatibility/2006">
               <mc:Choice xmlns:v="urn:schemas-microsoft-com:vml" Requires="v">
-                <p:oleObj spid="_x0000_s125967" name="Equation" r:id="rId3" imgW="2260440" imgH="457200" progId="Equation.3">
+                <p:oleObj spid="_x0000_s125974" name="Equation" r:id="rId3" imgW="2260440" imgH="457200" progId="Equation.3">
                   <p:embed/>
                 </p:oleObj>
               </mc:Choice>
@@ -22705,7 +22672,7 @@
                 </a:solidFill>
                 <a:latin typeface="Calibri" panose="020F0502020204030204" pitchFamily="34" charset="0"/>
               </a:rPr>
-              <a:t>Basic diagnostics: check </a:t>
+              <a:t>Basic diagnostics: #2 check </a:t>
             </a:r>
             <a:r>
               <a:rPr lang="en-US" altLang="en-US" sz="4000" dirty="0" err="1">
@@ -23636,26 +23603,16 @@
           </a:lstStyle>
           <a:p>
             <a:pPr marL="0" indent="0" algn="ctr" eaLnBrk="1" hangingPunct="1">
-              <a:buFont typeface="Arial" charset="0"/>
               <a:buNone/>
             </a:pPr>
             <a:r>
-              <a:rPr lang="en-US" altLang="en-US" b="1" dirty="0">
+              <a:rPr lang="en-US" altLang="en-US" dirty="0">
                 <a:solidFill>
                   <a:schemeClr val="tx2"/>
                 </a:solidFill>
                 <a:latin typeface="Calibri" panose="020F0502020204030204" pitchFamily="34" charset="0"/>
               </a:rPr>
-              <a:t>Basic diagnostics #2</a:t>
-            </a:r>
-            <a:r>
-              <a:rPr lang="en-US" altLang="en-US" dirty="0">
-                <a:solidFill>
-                  <a:schemeClr val="tx2"/>
-                </a:solidFill>
-                <a:latin typeface="Calibri" panose="020F0502020204030204" pitchFamily="34" charset="0"/>
-              </a:rPr>
-              <a:t>: Simulate from your estimated model and compare to the data.</a:t>
+              <a:t>Basic diagnostics: #3 Simulate from your estimated model and compare to the data.</a:t>
             </a:r>
           </a:p>
           <a:p>
@@ -23819,8 +23776,8 @@
         </p:nvSpPr>
         <p:spPr>
           <a:xfrm>
-            <a:off x="441434" y="4326375"/>
-            <a:ext cx="8560675" cy="2169017"/>
+            <a:off x="441434" y="3781169"/>
+            <a:ext cx="8560675" cy="2714224"/>
           </a:xfrm>
           <a:solidFill>
             <a:schemeClr val="bg1"/>
@@ -23831,10 +23788,10 @@
           <a:lstStyle/>
           <a:p>
             <a:r>
-              <a:rPr lang="en-US" b="1" dirty="0">
+              <a:rPr lang="en-US" dirty="0">
                 <a:latin typeface="+mn-lt"/>
               </a:rPr>
-              <a:t>Basic diagnostics #3 Simulate and then test whether you can re-capture the true estimates</a:t>
+              <a:t>Basic diagnostics #4 Simulate from known model and then test whether you can re-capture the true estimates</a:t>
             </a:r>
           </a:p>
         </p:txBody>
@@ -23842,7 +23799,7 @@
     </p:spTree>
     <p:extLst>
       <p:ext uri="{BB962C8B-B14F-4D97-AF65-F5344CB8AC3E}">
-        <p14:creationId xmlns:p14="http://schemas.microsoft.com/office/powerpoint/2010/main" val="545414265"/>
+        <p14:creationId xmlns:p14="http://schemas.microsoft.com/office/powerpoint/2010/main" val="2237271056"/>
       </p:ext>
     </p:extLst>
   </p:cSld>
@@ -23871,6 +23828,537 @@
       </p:grpSpPr>
       <p:sp>
         <p:nvSpPr>
+          <p:cNvPr id="23554" name="Rectangle 2"/>
+          <p:cNvSpPr>
+            <a:spLocks noGrp="1" noChangeArrowheads="1"/>
+          </p:cNvSpPr>
+          <p:nvPr>
+            <p:ph type="title"/>
+          </p:nvPr>
+        </p:nvSpPr>
+        <p:spPr>
+          <a:xfrm>
+            <a:off x="475860" y="0"/>
+            <a:ext cx="8192279" cy="1143000"/>
+          </a:xfrm>
+        </p:spPr>
+        <p:txBody>
+          <a:bodyPr/>
+          <a:lstStyle/>
+          <a:p>
+            <a:pPr eaLnBrk="1" hangingPunct="1"/>
+            <a:r>
+              <a:rPr lang="en-US" altLang="en-US" sz="2800" dirty="0">
+                <a:solidFill>
+                  <a:schemeClr val="tx2"/>
+                </a:solidFill>
+                <a:latin typeface="Calibri" panose="020F0502020204030204" pitchFamily="34" charset="0"/>
+              </a:rPr>
+              <a:t>How do you know when to use a process error or observation error model?</a:t>
+            </a:r>
+          </a:p>
+        </p:txBody>
+      </p:sp>
+      <p:sp>
+        <p:nvSpPr>
+          <p:cNvPr id="23555" name="Rectangle 3"/>
+          <p:cNvSpPr>
+            <a:spLocks noGrp="1" noChangeArrowheads="1"/>
+          </p:cNvSpPr>
+          <p:nvPr>
+            <p:ph idx="1"/>
+          </p:nvPr>
+        </p:nvSpPr>
+        <p:spPr>
+          <a:xfrm>
+            <a:off x="533400" y="1447800"/>
+            <a:ext cx="8229600" cy="4953000"/>
+          </a:xfrm>
+        </p:spPr>
+        <p:txBody>
+          <a:bodyPr/>
+          <a:lstStyle/>
+          <a:p>
+            <a:pPr eaLnBrk="1" hangingPunct="1">
+              <a:lnSpc>
+                <a:spcPct val="90000"/>
+              </a:lnSpc>
+              <a:buFont typeface="Arial" panose="020B0604020202020204" pitchFamily="34" charset="0"/>
+              <a:buChar char="•"/>
+            </a:pPr>
+            <a:r>
+              <a:rPr lang="en-US" altLang="en-US" sz="2400" dirty="0"/>
+              <a:t>If your time-series data contain both types, use a model with both types.</a:t>
+            </a:r>
+          </a:p>
+          <a:p>
+            <a:pPr eaLnBrk="1" hangingPunct="1">
+              <a:lnSpc>
+                <a:spcPct val="90000"/>
+              </a:lnSpc>
+              <a:buFont typeface="Arial" panose="020B0604020202020204" pitchFamily="34" charset="0"/>
+              <a:buChar char="•"/>
+            </a:pPr>
+            <a:endParaRPr lang="en-US" altLang="en-US" sz="2400" dirty="0"/>
+          </a:p>
+          <a:p>
+            <a:pPr eaLnBrk="1" hangingPunct="1">
+              <a:lnSpc>
+                <a:spcPct val="90000"/>
+              </a:lnSpc>
+              <a:buFont typeface="Arial" panose="020B0604020202020204" pitchFamily="34" charset="0"/>
+              <a:buChar char="•"/>
+            </a:pPr>
+            <a:r>
+              <a:rPr lang="en-US" altLang="en-US" sz="2400" dirty="0"/>
+              <a:t>To estimate both variances, you need a) 20+ time steps </a:t>
+            </a:r>
+            <a:r>
+              <a:rPr lang="en-US" altLang="en-US" sz="2400" b="1" dirty="0"/>
+              <a:t>OR</a:t>
+            </a:r>
+            <a:r>
+              <a:rPr lang="en-US" altLang="en-US" sz="2400" dirty="0"/>
+              <a:t> b) multi-site data.  </a:t>
+            </a:r>
+          </a:p>
+          <a:p>
+            <a:pPr eaLnBrk="1" hangingPunct="1">
+              <a:lnSpc>
+                <a:spcPct val="90000"/>
+              </a:lnSpc>
+              <a:buFont typeface="Arial" panose="020B0604020202020204" pitchFamily="34" charset="0"/>
+              <a:buChar char="•"/>
+            </a:pPr>
+            <a:endParaRPr lang="en-US" altLang="en-US" sz="2400" dirty="0">
+              <a:solidFill>
+                <a:srgbClr val="0000FF"/>
+              </a:solidFill>
+            </a:endParaRPr>
+          </a:p>
+          <a:p>
+            <a:pPr eaLnBrk="1" hangingPunct="1">
+              <a:lnSpc>
+                <a:spcPct val="90000"/>
+              </a:lnSpc>
+              <a:buFont typeface="Arial" panose="020B0604020202020204" pitchFamily="34" charset="0"/>
+              <a:buChar char="•"/>
+            </a:pPr>
+            <a:r>
+              <a:rPr lang="en-US" altLang="en-US" sz="2400" dirty="0"/>
+              <a:t>If you don’t have enough data, you need to use assumptions about one of the variances.  Meaning a) fix the value or b) incorporate a prior.</a:t>
+            </a:r>
+          </a:p>
+          <a:p>
+            <a:pPr eaLnBrk="1" hangingPunct="1">
+              <a:lnSpc>
+                <a:spcPct val="90000"/>
+              </a:lnSpc>
+              <a:buFont typeface="Arial" panose="020B0604020202020204" pitchFamily="34" charset="0"/>
+              <a:buChar char="•"/>
+            </a:pPr>
+            <a:endParaRPr lang="en-US" altLang="en-US" sz="2400" dirty="0"/>
+          </a:p>
+          <a:p>
+            <a:pPr eaLnBrk="1" hangingPunct="1">
+              <a:lnSpc>
+                <a:spcPct val="90000"/>
+              </a:lnSpc>
+              <a:buFont typeface="Arial" panose="020B0604020202020204" pitchFamily="34" charset="0"/>
+              <a:buChar char="•"/>
+            </a:pPr>
+            <a:r>
+              <a:rPr lang="en-US" altLang="en-US" sz="2400" dirty="0"/>
+              <a:t>Diagnostics: Observation error induces autocorrelation in the noise of an autoregressive process. Fit a process-error only model (R=0) and check for autocorrelation of residuals</a:t>
+            </a:r>
+            <a:br>
+              <a:rPr lang="en-US" altLang="en-US" sz="2400" dirty="0"/>
+            </a:br>
+            <a:br>
+              <a:rPr lang="en-US" altLang="en-US" sz="2400" dirty="0"/>
+            </a:br>
+            <a:br>
+              <a:rPr lang="en-US" altLang="en-US" sz="2400" dirty="0"/>
+            </a:br>
+            <a:endParaRPr lang="en-US" altLang="en-US" sz="2400" dirty="0"/>
+          </a:p>
+        </p:txBody>
+      </p:sp>
+      <p:sp>
+        <p:nvSpPr>
+          <p:cNvPr id="4" name="Rectangle 3"/>
+          <p:cNvSpPr>
+            <a:spLocks noChangeArrowheads="1"/>
+          </p:cNvSpPr>
+          <p:nvPr/>
+        </p:nvSpPr>
+        <p:spPr bwMode="auto">
+          <a:xfrm>
+            <a:off x="327025" y="1119188"/>
+            <a:ext cx="8489950" cy="44450"/>
+          </a:xfrm>
+          <a:prstGeom prst="rect">
+            <a:avLst/>
+          </a:prstGeom>
+          <a:gradFill rotWithShape="1">
+            <a:gsLst>
+              <a:gs pos="0">
+                <a:srgbClr val="9AB5E4"/>
+              </a:gs>
+              <a:gs pos="50000">
+                <a:srgbClr val="C2D1ED"/>
+              </a:gs>
+              <a:gs pos="100000">
+                <a:srgbClr val="E1E8F5"/>
+              </a:gs>
+            </a:gsLst>
+            <a:lin ang="0" scaled="1"/>
+          </a:gradFill>
+          <a:ln w="25400">
+            <a:noFill/>
+            <a:miter lim="800000"/>
+            <a:headEnd/>
+            <a:tailEnd/>
+          </a:ln>
+          <a:effectLst>
+            <a:outerShdw blurRad="63500" dist="38100" dir="2700000" algn="tl" rotWithShape="0">
+              <a:srgbClr val="000000">
+                <a:alpha val="39999"/>
+              </a:srgbClr>
+            </a:outerShdw>
+          </a:effectLst>
+        </p:spPr>
+        <p:txBody>
+          <a:bodyPr anchor="ctr"/>
+          <a:lstStyle/>
+          <a:p>
+            <a:pPr algn="ctr">
+              <a:defRPr/>
+            </a:pPr>
+            <a:endParaRPr lang="en-US">
+              <a:solidFill>
+                <a:prstClr val="white"/>
+              </a:solidFill>
+              <a:latin typeface="+mn-lt"/>
+              <a:ea typeface="+mn-ea"/>
+              <a:cs typeface="+mn-cs"/>
+            </a:endParaRPr>
+          </a:p>
+        </p:txBody>
+      </p:sp>
+    </p:spTree>
+    <p:extLst>
+      <p:ext uri="{BB962C8B-B14F-4D97-AF65-F5344CB8AC3E}">
+        <p14:creationId xmlns:p14="http://schemas.microsoft.com/office/powerpoint/2010/main" val="4167806049"/>
+      </p:ext>
+    </p:extLst>
+  </p:cSld>
+  <p:clrMapOvr>
+    <a:masterClrMapping/>
+  </p:clrMapOvr>
+</p:sld>
+</file>
+
+<file path=ppt/slides/slide45.xml><?xml version="1.0" encoding="utf-8"?>
+<p:sld xmlns:a="http://schemas.openxmlformats.org/drawingml/2006/main" xmlns:r="http://schemas.openxmlformats.org/officeDocument/2006/relationships" xmlns:p="http://schemas.openxmlformats.org/presentationml/2006/main">
+  <p:cSld>
+    <p:spTree>
+      <p:nvGrpSpPr>
+        <p:cNvPr id="1" name=""/>
+        <p:cNvGrpSpPr/>
+        <p:nvPr/>
+      </p:nvGrpSpPr>
+      <p:grpSpPr>
+        <a:xfrm>
+          <a:off x="0" y="0"/>
+          <a:ext cx="0" cy="0"/>
+          <a:chOff x="0" y="0"/>
+          <a:chExt cx="0" cy="0"/>
+        </a:xfrm>
+      </p:grpSpPr>
+      <p:sp>
+        <p:nvSpPr>
+          <p:cNvPr id="24578" name="Rectangle 2"/>
+          <p:cNvSpPr>
+            <a:spLocks noGrp="1" noChangeArrowheads="1"/>
+          </p:cNvSpPr>
+          <p:nvPr>
+            <p:ph type="title"/>
+          </p:nvPr>
+        </p:nvSpPr>
+        <p:spPr>
+          <a:xfrm>
+            <a:off x="466531" y="0"/>
+            <a:ext cx="8136294" cy="1143000"/>
+          </a:xfrm>
+        </p:spPr>
+        <p:txBody>
+          <a:bodyPr/>
+          <a:lstStyle/>
+          <a:p>
+            <a:pPr eaLnBrk="1" hangingPunct="1"/>
+            <a:r>
+              <a:rPr lang="en-US" altLang="en-US" sz="3600" dirty="0">
+                <a:solidFill>
+                  <a:schemeClr val="tx2"/>
+                </a:solidFill>
+                <a:latin typeface="Calibri" panose="020F0502020204030204" pitchFamily="34" charset="0"/>
+              </a:rPr>
+              <a:t>Other types of “non-process” error</a:t>
+            </a:r>
+          </a:p>
+        </p:txBody>
+      </p:sp>
+      <p:sp>
+        <p:nvSpPr>
+          <p:cNvPr id="10243" name="Rectangle 3"/>
+          <p:cNvSpPr>
+            <a:spLocks noGrp="1" noChangeArrowheads="1"/>
+          </p:cNvSpPr>
+          <p:nvPr>
+            <p:ph idx="1"/>
+          </p:nvPr>
+        </p:nvSpPr>
+        <p:spPr>
+          <a:xfrm>
+            <a:off x="228600" y="1371600"/>
+            <a:ext cx="8686800" cy="5105400"/>
+          </a:xfrm>
+        </p:spPr>
+        <p:txBody>
+          <a:bodyPr/>
+          <a:lstStyle/>
+          <a:p>
+            <a:pPr eaLnBrk="1" hangingPunct="1">
+              <a:lnSpc>
+                <a:spcPct val="80000"/>
+              </a:lnSpc>
+              <a:defRPr/>
+            </a:pPr>
+            <a:r>
+              <a:rPr lang="en-US" sz="2400" dirty="0"/>
+              <a:t>Fluctuations that don’t have “feedback” (variance doesn’t explode)</a:t>
+            </a:r>
+            <a:endParaRPr lang="en-US" sz="1800" dirty="0"/>
+          </a:p>
+          <a:p>
+            <a:pPr marL="457200" lvl="1" indent="0" eaLnBrk="1" hangingPunct="1">
+              <a:lnSpc>
+                <a:spcPct val="80000"/>
+              </a:lnSpc>
+              <a:buFontTx/>
+              <a:buNone/>
+              <a:defRPr/>
+            </a:pPr>
+            <a:endParaRPr lang="en-US" sz="2400" dirty="0"/>
+          </a:p>
+          <a:p>
+            <a:pPr eaLnBrk="1" hangingPunct="1">
+              <a:lnSpc>
+                <a:spcPct val="80000"/>
+              </a:lnSpc>
+              <a:defRPr/>
+            </a:pPr>
+            <a:r>
+              <a:rPr lang="en-US" sz="2400" dirty="0"/>
+              <a:t>Lots of biological processes also create noise that looks like that</a:t>
+            </a:r>
+          </a:p>
+          <a:p>
+            <a:pPr lvl="1" eaLnBrk="1" hangingPunct="1">
+              <a:lnSpc>
+                <a:spcPct val="80000"/>
+              </a:lnSpc>
+              <a:defRPr/>
+            </a:pPr>
+            <a:r>
+              <a:rPr lang="en-US" sz="1800" dirty="0"/>
+              <a:t>age-structure cycles                   o  cyclic variability in fecundity</a:t>
+            </a:r>
+          </a:p>
+          <a:p>
+            <a:pPr lvl="1" eaLnBrk="1" hangingPunct="1">
+              <a:lnSpc>
+                <a:spcPct val="80000"/>
+              </a:lnSpc>
+              <a:defRPr/>
+            </a:pPr>
+            <a:r>
+              <a:rPr lang="en-US" sz="1800" dirty="0"/>
+              <a:t>density-dependence                    o  predator-prey interactions</a:t>
+            </a:r>
+          </a:p>
+          <a:p>
+            <a:pPr lvl="1" eaLnBrk="1" hangingPunct="1">
+              <a:lnSpc>
+                <a:spcPct val="80000"/>
+              </a:lnSpc>
+              <a:defRPr/>
+            </a:pPr>
+            <a:endParaRPr lang="en-US" sz="1800" dirty="0"/>
+          </a:p>
+          <a:p>
+            <a:pPr eaLnBrk="1" hangingPunct="1">
+              <a:lnSpc>
+                <a:spcPct val="80000"/>
+              </a:lnSpc>
+              <a:defRPr/>
+            </a:pPr>
+            <a:r>
+              <a:rPr lang="en-US" sz="2400" dirty="0"/>
+              <a:t>If your model cannot accommodate that cycling, </a:t>
+            </a:r>
+          </a:p>
+          <a:p>
+            <a:pPr lvl="1" eaLnBrk="1" hangingPunct="1">
+              <a:lnSpc>
+                <a:spcPct val="80000"/>
+              </a:lnSpc>
+              <a:defRPr/>
+            </a:pPr>
+            <a:r>
+              <a:rPr lang="en-US" sz="2000" dirty="0"/>
+              <a:t>it tends to get ‘soaked’ up in the ‘non-process’ error component</a:t>
+            </a:r>
+          </a:p>
+          <a:p>
+            <a:pPr lvl="1" eaLnBrk="1" hangingPunct="1">
+              <a:lnSpc>
+                <a:spcPct val="80000"/>
+              </a:lnSpc>
+              <a:defRPr/>
+            </a:pPr>
+            <a:endParaRPr lang="en-US" sz="2000" dirty="0"/>
+          </a:p>
+          <a:p>
+            <a:pPr eaLnBrk="1" hangingPunct="1">
+              <a:lnSpc>
+                <a:spcPct val="80000"/>
+              </a:lnSpc>
+              <a:defRPr/>
+            </a:pPr>
+            <a:r>
+              <a:rPr lang="en-US" sz="2400" dirty="0"/>
+              <a:t>If your model can accommodate that cycling, </a:t>
+            </a:r>
+          </a:p>
+          <a:p>
+            <a:pPr lvl="1" eaLnBrk="1" hangingPunct="1">
+              <a:lnSpc>
+                <a:spcPct val="80000"/>
+              </a:lnSpc>
+              <a:defRPr/>
+            </a:pPr>
+            <a:r>
+              <a:rPr lang="en-US" sz="2000" dirty="0"/>
+              <a:t>estimation of ‘observation error’ variance can be confounded, unless you have long, long datasets or replicates</a:t>
+            </a:r>
+          </a:p>
+          <a:p>
+            <a:pPr lvl="1" eaLnBrk="1" hangingPunct="1">
+              <a:lnSpc>
+                <a:spcPct val="80000"/>
+              </a:lnSpc>
+              <a:defRPr/>
+            </a:pPr>
+            <a:endParaRPr lang="en-US" sz="2400" dirty="0"/>
+          </a:p>
+        </p:txBody>
+      </p:sp>
+      <p:sp>
+        <p:nvSpPr>
+          <p:cNvPr id="4" name="Rectangle 3"/>
+          <p:cNvSpPr>
+            <a:spLocks noChangeArrowheads="1"/>
+          </p:cNvSpPr>
+          <p:nvPr/>
+        </p:nvSpPr>
+        <p:spPr bwMode="auto">
+          <a:xfrm>
+            <a:off x="327025" y="1119188"/>
+            <a:ext cx="8489950" cy="44450"/>
+          </a:xfrm>
+          <a:prstGeom prst="rect">
+            <a:avLst/>
+          </a:prstGeom>
+          <a:gradFill rotWithShape="1">
+            <a:gsLst>
+              <a:gs pos="0">
+                <a:srgbClr val="9AB5E4"/>
+              </a:gs>
+              <a:gs pos="50000">
+                <a:srgbClr val="C2D1ED"/>
+              </a:gs>
+              <a:gs pos="100000">
+                <a:srgbClr val="E1E8F5"/>
+              </a:gs>
+            </a:gsLst>
+            <a:lin ang="0" scaled="1"/>
+          </a:gradFill>
+          <a:ln w="25400">
+            <a:noFill/>
+            <a:miter lim="800000"/>
+            <a:headEnd/>
+            <a:tailEnd/>
+          </a:ln>
+          <a:effectLst>
+            <a:outerShdw blurRad="63500" dist="38100" dir="2700000" algn="tl" rotWithShape="0">
+              <a:srgbClr val="000000">
+                <a:alpha val="39999"/>
+              </a:srgbClr>
+            </a:outerShdw>
+          </a:effectLst>
+        </p:spPr>
+        <p:txBody>
+          <a:bodyPr anchor="ctr"/>
+          <a:lstStyle/>
+          <a:p>
+            <a:pPr algn="ctr">
+              <a:defRPr/>
+            </a:pPr>
+            <a:endParaRPr lang="en-US">
+              <a:solidFill>
+                <a:prstClr val="white"/>
+              </a:solidFill>
+              <a:latin typeface="+mn-lt"/>
+              <a:ea typeface="+mn-ea"/>
+              <a:cs typeface="+mn-cs"/>
+            </a:endParaRPr>
+          </a:p>
+        </p:txBody>
+      </p:sp>
+    </p:spTree>
+    <p:extLst>
+      <p:ext uri="{BB962C8B-B14F-4D97-AF65-F5344CB8AC3E}">
+        <p14:creationId xmlns:p14="http://schemas.microsoft.com/office/powerpoint/2010/main" val="4281231748"/>
+      </p:ext>
+    </p:extLst>
+  </p:cSld>
+  <p:clrMapOvr>
+    <a:masterClrMapping/>
+  </p:clrMapOvr>
+</p:sld>
+</file>
+
+<file path=ppt/slides/slide46.xml><?xml version="1.0" encoding="utf-8"?>
+<p:sld xmlns:a="http://schemas.openxmlformats.org/drawingml/2006/main" xmlns:r="http://schemas.openxmlformats.org/officeDocument/2006/relationships" xmlns:p="http://schemas.openxmlformats.org/presentationml/2006/main">
+  <p:cSld>
+    <p:spTree>
+      <p:nvGrpSpPr>
+        <p:cNvPr id="1" name=""/>
+        <p:cNvGrpSpPr/>
+        <p:nvPr/>
+      </p:nvGrpSpPr>
+      <p:grpSpPr>
+        <a:xfrm>
+          <a:off x="0" y="0"/>
+          <a:ext cx="0" cy="0"/>
+          <a:chOff x="0" y="0"/>
+          <a:chExt cx="0" cy="0"/>
+        </a:xfrm>
+      </p:grpSpPr>
+      <p:sp>
+        <p:nvSpPr>
           <p:cNvPr id="2" name="Title 1"/>
           <p:cNvSpPr>
             <a:spLocks noGrp="1"/>
@@ -23924,7 +24412,7 @@
           <a:graphicData uri="http://schemas.openxmlformats.org/presentationml/2006/ole">
             <mc:AlternateContent xmlns:mc="http://schemas.openxmlformats.org/markup-compatibility/2006">
               <mc:Choice xmlns:v="urn:schemas-microsoft-com:vml" Requires="v">
-                <p:oleObj spid="_x0000_s123940" name="Equation" r:id="rId3" imgW="2552700" imgH="1168400" progId="Equation.3">
+                <p:oleObj spid="_x0000_s123947" name="Equation" r:id="rId3" imgW="2552700" imgH="1168400" progId="Equation.3">
                   <p:embed/>
                 </p:oleObj>
               </mc:Choice>
@@ -24337,7 +24825,7 @@
           <a:graphicData uri="http://schemas.openxmlformats.org/presentationml/2006/ole">
             <mc:AlternateContent xmlns:mc="http://schemas.openxmlformats.org/markup-compatibility/2006">
               <mc:Choice xmlns:v="urn:schemas-microsoft-com:vml" Requires="v">
-                <p:oleObj spid="_x0000_s119872" name="Equation" r:id="rId3" imgW="2260440" imgH="457200" progId="Equation.3">
+                <p:oleObj spid="_x0000_s119879" name="Equation" r:id="rId3" imgW="2260440" imgH="457200" progId="Equation.3">
                   <p:embed/>
                 </p:oleObj>
               </mc:Choice>
@@ -24916,7 +25404,7 @@
           <a:graphicData uri="http://schemas.openxmlformats.org/presentationml/2006/ole">
             <mc:AlternateContent xmlns:mc="http://schemas.openxmlformats.org/markup-compatibility/2006">
               <mc:Choice xmlns:v="urn:schemas-microsoft-com:vml" Requires="v">
-                <p:oleObj spid="_x0000_s121898" name="Equation" r:id="rId3" imgW="1066680" imgH="685800" progId="Equation.3">
+                <p:oleObj spid="_x0000_s121905" name="Equation" r:id="rId3" imgW="1066680" imgH="685800" progId="Equation.3">
                   <p:embed/>
                 </p:oleObj>
               </mc:Choice>
@@ -25328,7 +25816,7 @@
           <a:graphicData uri="http://schemas.openxmlformats.org/presentationml/2006/ole">
             <mc:AlternateContent xmlns:mc="http://schemas.openxmlformats.org/markup-compatibility/2006">
               <mc:Choice xmlns:v="urn:schemas-microsoft-com:vml" Requires="v">
-                <p:oleObj spid="_x0000_s117825" name="Equation" r:id="rId3" imgW="1244600" imgH="698500" progId="Equation.3">
+                <p:oleObj spid="_x0000_s117832" name="Equation" r:id="rId3" imgW="1244600" imgH="698500" progId="Equation.3">
                   <p:embed/>
                 </p:oleObj>
               </mc:Choice>
@@ -26199,7 +26687,7 @@
           <a:graphicData uri="http://schemas.openxmlformats.org/presentationml/2006/ole">
             <mc:AlternateContent xmlns:mc="http://schemas.openxmlformats.org/markup-compatibility/2006">
               <mc:Choice xmlns:v="urn:schemas-microsoft-com:vml" Requires="v">
-                <p:oleObj spid="_x0000_s126987" name="Equation" r:id="rId3" imgW="1244600" imgH="698500" progId="Equation.3">
+                <p:oleObj spid="_x0000_s126994" name="Equation" r:id="rId3" imgW="1244600" imgH="698500" progId="Equation.3">
                   <p:embed/>
                 </p:oleObj>
               </mc:Choice>
@@ -27062,7 +27550,7 @@
           <a:graphicData uri="http://schemas.openxmlformats.org/presentationml/2006/ole">
             <mc:AlternateContent xmlns:mc="http://schemas.openxmlformats.org/markup-compatibility/2006">
               <mc:Choice xmlns:v="urn:schemas-microsoft-com:vml" Requires="v">
-                <p:oleObj spid="_x0000_s118890" name="Equation" r:id="rId3" imgW="2298600" imgH="228600" progId="Equation.3">
+                <p:oleObj spid="_x0000_s118904" name="Equation" r:id="rId3" imgW="2298600" imgH="228600" progId="Equation.3">
                   <p:embed/>
                 </p:oleObj>
               </mc:Choice>
@@ -27430,7 +27918,7 @@
           <a:graphicData uri="http://schemas.openxmlformats.org/presentationml/2006/ole">
             <mc:AlternateContent xmlns:mc="http://schemas.openxmlformats.org/markup-compatibility/2006">
               <mc:Choice xmlns:v="urn:schemas-microsoft-com:vml" Requires="v">
-                <p:oleObj spid="_x0000_s118891" name="Equation" r:id="rId5" imgW="2260440" imgH="228600" progId="Equation.3">
+                <p:oleObj spid="_x0000_s118905" name="Equation" r:id="rId5" imgW="2260440" imgH="228600" progId="Equation.3">
                   <p:embed/>
                 </p:oleObj>
               </mc:Choice>

</xml_diff>